<commit_message>
Add figures for "Rectangles Everywhere!" puzzle.
</commit_message>
<xml_diff>
--- a/puzzles/figures/6pVn3BbaY2SPB5LzpwF4ko.pptx
+++ b/puzzles/figures/6pVn3BbaY2SPB5LzpwF4ko.pptx
@@ -199,7 +199,7 @@
           <a:p>
             <a:fld id="{C252B796-5EEC-A040-BCC4-F8757A1DA040}" type="datetimeFigureOut">
               <a:rPr lang="en-US" smtClean="0"/>
-              <a:t>11/2/22</a:t>
+              <a:t>11/12/22</a:t>
             </a:fld>
             <a:endParaRPr lang="en-US"/>
           </a:p>
@@ -865,7 +865,7 @@
           <a:p>
             <a:fld id="{AC7AAF1B-2157-7B4E-9885-5B0EDA675504}" type="datetimeFigureOut">
               <a:rPr lang="en-US" smtClean="0"/>
-              <a:t>11/2/22</a:t>
+              <a:t>11/12/22</a:t>
             </a:fld>
             <a:endParaRPr lang="en-US"/>
           </a:p>
@@ -1063,7 +1063,7 @@
           <a:p>
             <a:fld id="{AC7AAF1B-2157-7B4E-9885-5B0EDA675504}" type="datetimeFigureOut">
               <a:rPr lang="en-US" smtClean="0"/>
-              <a:t>11/2/22</a:t>
+              <a:t>11/12/22</a:t>
             </a:fld>
             <a:endParaRPr lang="en-US"/>
           </a:p>
@@ -1271,7 +1271,7 @@
           <a:p>
             <a:fld id="{AC7AAF1B-2157-7B4E-9885-5B0EDA675504}" type="datetimeFigureOut">
               <a:rPr lang="en-US" smtClean="0"/>
-              <a:t>11/2/22</a:t>
+              <a:t>11/12/22</a:t>
             </a:fld>
             <a:endParaRPr lang="en-US"/>
           </a:p>
@@ -1469,7 +1469,7 @@
           <a:p>
             <a:fld id="{AC7AAF1B-2157-7B4E-9885-5B0EDA675504}" type="datetimeFigureOut">
               <a:rPr lang="en-US" smtClean="0"/>
-              <a:t>11/2/22</a:t>
+              <a:t>11/12/22</a:t>
             </a:fld>
             <a:endParaRPr lang="en-US"/>
           </a:p>
@@ -1744,7 +1744,7 @@
           <a:p>
             <a:fld id="{AC7AAF1B-2157-7B4E-9885-5B0EDA675504}" type="datetimeFigureOut">
               <a:rPr lang="en-US" smtClean="0"/>
-              <a:t>11/2/22</a:t>
+              <a:t>11/12/22</a:t>
             </a:fld>
             <a:endParaRPr lang="en-US"/>
           </a:p>
@@ -2009,7 +2009,7 @@
           <a:p>
             <a:fld id="{AC7AAF1B-2157-7B4E-9885-5B0EDA675504}" type="datetimeFigureOut">
               <a:rPr lang="en-US" smtClean="0"/>
-              <a:t>11/2/22</a:t>
+              <a:t>11/12/22</a:t>
             </a:fld>
             <a:endParaRPr lang="en-US"/>
           </a:p>
@@ -2421,7 +2421,7 @@
           <a:p>
             <a:fld id="{AC7AAF1B-2157-7B4E-9885-5B0EDA675504}" type="datetimeFigureOut">
               <a:rPr lang="en-US" smtClean="0"/>
-              <a:t>11/2/22</a:t>
+              <a:t>11/12/22</a:t>
             </a:fld>
             <a:endParaRPr lang="en-US"/>
           </a:p>
@@ -2567,7 +2567,7 @@
           <a:p>
             <a:fld id="{AC7AAF1B-2157-7B4E-9885-5B0EDA675504}" type="datetimeFigureOut">
               <a:rPr lang="en-US" smtClean="0"/>
-              <a:t>11/2/22</a:t>
+              <a:t>11/12/22</a:t>
             </a:fld>
             <a:endParaRPr lang="en-US"/>
           </a:p>
@@ -2680,7 +2680,7 @@
           <a:p>
             <a:fld id="{AC7AAF1B-2157-7B4E-9885-5B0EDA675504}" type="datetimeFigureOut">
               <a:rPr lang="en-US" smtClean="0"/>
-              <a:t>11/2/22</a:t>
+              <a:t>11/12/22</a:t>
             </a:fld>
             <a:endParaRPr lang="en-US"/>
           </a:p>
@@ -2991,7 +2991,7 @@
           <a:p>
             <a:fld id="{AC7AAF1B-2157-7B4E-9885-5B0EDA675504}" type="datetimeFigureOut">
               <a:rPr lang="en-US" smtClean="0"/>
-              <a:t>11/2/22</a:t>
+              <a:t>11/12/22</a:t>
             </a:fld>
             <a:endParaRPr lang="en-US"/>
           </a:p>
@@ -3279,7 +3279,7 @@
           <a:p>
             <a:fld id="{AC7AAF1B-2157-7B4E-9885-5B0EDA675504}" type="datetimeFigureOut">
               <a:rPr lang="en-US" smtClean="0"/>
-              <a:t>11/2/22</a:t>
+              <a:t>11/12/22</a:t>
             </a:fld>
             <a:endParaRPr lang="en-US"/>
           </a:p>
@@ -3520,7 +3520,7 @@
           <a:p>
             <a:fld id="{AC7AAF1B-2157-7B4E-9885-5B0EDA675504}" type="datetimeFigureOut">
               <a:rPr lang="en-US" smtClean="0"/>
-              <a:t>11/2/22</a:t>
+              <a:t>11/12/22</a:t>
             </a:fld>
             <a:endParaRPr lang="en-US"/>
           </a:p>
@@ -5393,10 +5393,10 @@
       </p:grpSpPr>
       <p:grpSp>
         <p:nvGrpSpPr>
-          <p:cNvPr id="7" name="Group 6">
+          <p:cNvPr id="4" name="Group 3">
             <a:extLst>
               <a:ext uri="{FF2B5EF4-FFF2-40B4-BE49-F238E27FC236}">
-                <a16:creationId xmlns:a16="http://schemas.microsoft.com/office/drawing/2014/main" id="{6B7CDC5F-50E6-1E4C-927E-AF318AB49F60}"/>
+                <a16:creationId xmlns:a16="http://schemas.microsoft.com/office/drawing/2014/main" id="{9C2FB2D3-B3EA-DE4E-BFCE-C2294AD6FBF4}"/>
               </a:ext>
             </a:extLst>
           </p:cNvPr>
@@ -5841,8 +5841,8 @@
           </p:nvSpPr>
           <p:spPr>
             <a:xfrm>
-              <a:off x="5517928" y="1559675"/>
-              <a:ext cx="1324303" cy="338554"/>
+              <a:off x="5517928" y="1528897"/>
+              <a:ext cx="1324303" cy="400110"/>
             </a:xfrm>
             <a:prstGeom prst="rect">
               <a:avLst/>
@@ -5857,144 +5857,8 @@
             <a:p>
               <a:pPr algn="ctr"/>
               <a:r>
-                <a:rPr lang="en-US" sz="1600" b="1" dirty="0"/>
+                <a:rPr lang="en-US" sz="2000" b="1" dirty="0"/>
                 <a:t>.   .   .</a:t>
-              </a:r>
-            </a:p>
-          </p:txBody>
-        </p:sp>
-        <p:sp>
-          <p:nvSpPr>
-            <p:cNvPr id="34" name="TextBox 33">
-              <a:extLst>
-                <a:ext uri="{FF2B5EF4-FFF2-40B4-BE49-F238E27FC236}">
-                  <a16:creationId xmlns:a16="http://schemas.microsoft.com/office/drawing/2014/main" id="{49CF2E99-C5DF-4F45-AE9E-3C7AB0784F49}"/>
-                </a:ext>
-              </a:extLst>
-            </p:cNvPr>
-            <p:cNvSpPr txBox="1"/>
-            <p:nvPr/>
-          </p:nvSpPr>
-          <p:spPr>
-            <a:xfrm>
-              <a:off x="2869324" y="2206833"/>
-              <a:ext cx="1324303" cy="830997"/>
-            </a:xfrm>
-            <a:prstGeom prst="rect">
-              <a:avLst/>
-            </a:prstGeom>
-            <a:noFill/>
-          </p:spPr>
-          <p:txBody>
-            <a:bodyPr wrap="square" rtlCol="0" anchor="ctr">
-              <a:spAutoFit/>
-            </a:bodyPr>
-            <a:lstStyle/>
-            <a:p>
-              <a:pPr algn="ctr"/>
-              <a:r>
-                <a:rPr lang="en-US" sz="1600" b="1" dirty="0"/>
-                <a:t>.</a:t>
-              </a:r>
-            </a:p>
-            <a:p>
-              <a:pPr algn="ctr"/>
-              <a:r>
-                <a:rPr lang="en-US" sz="1600" b="1" dirty="0"/>
-                <a:t>.</a:t>
-              </a:r>
-            </a:p>
-            <a:p>
-              <a:pPr algn="ctr"/>
-              <a:r>
-                <a:rPr lang="en-US" sz="1600" b="1" dirty="0"/>
-                <a:t>.</a:t>
-              </a:r>
-            </a:p>
-          </p:txBody>
-        </p:sp>
-        <p:sp>
-          <p:nvSpPr>
-            <p:cNvPr id="35" name="TextBox 34">
-              <a:extLst>
-                <a:ext uri="{FF2B5EF4-FFF2-40B4-BE49-F238E27FC236}">
-                  <a16:creationId xmlns:a16="http://schemas.microsoft.com/office/drawing/2014/main" id="{8067811C-A6B2-F843-8792-4A8B8D85E5E1}"/>
-                </a:ext>
-              </a:extLst>
-            </p:cNvPr>
-            <p:cNvSpPr txBox="1"/>
-            <p:nvPr/>
-          </p:nvSpPr>
-          <p:spPr>
-            <a:xfrm>
-              <a:off x="5517929" y="3346435"/>
-              <a:ext cx="1324303" cy="338554"/>
-            </a:xfrm>
-            <a:prstGeom prst="rect">
-              <a:avLst/>
-            </a:prstGeom>
-            <a:noFill/>
-          </p:spPr>
-          <p:txBody>
-            <a:bodyPr wrap="square" rtlCol="0" anchor="ctr">
-              <a:spAutoFit/>
-            </a:bodyPr>
-            <a:lstStyle/>
-            <a:p>
-              <a:pPr algn="ctr"/>
-              <a:r>
-                <a:rPr lang="en-US" sz="1600" b="1" dirty="0"/>
-                <a:t>.   .   .</a:t>
-              </a:r>
-            </a:p>
-          </p:txBody>
-        </p:sp>
-        <p:sp>
-          <p:nvSpPr>
-            <p:cNvPr id="36" name="TextBox 35">
-              <a:extLst>
-                <a:ext uri="{FF2B5EF4-FFF2-40B4-BE49-F238E27FC236}">
-                  <a16:creationId xmlns:a16="http://schemas.microsoft.com/office/drawing/2014/main" id="{12CD6C4E-143D-7E44-BE76-4DF51B988627}"/>
-                </a:ext>
-              </a:extLst>
-            </p:cNvPr>
-            <p:cNvSpPr txBox="1"/>
-            <p:nvPr/>
-          </p:nvSpPr>
-          <p:spPr>
-            <a:xfrm>
-              <a:off x="8166536" y="2206832"/>
-              <a:ext cx="1324303" cy="830997"/>
-            </a:xfrm>
-            <a:prstGeom prst="rect">
-              <a:avLst/>
-            </a:prstGeom>
-            <a:noFill/>
-          </p:spPr>
-          <p:txBody>
-            <a:bodyPr wrap="square" rtlCol="0" anchor="ctr">
-              <a:spAutoFit/>
-            </a:bodyPr>
-            <a:lstStyle/>
-            <a:p>
-              <a:pPr algn="ctr"/>
-              <a:r>
-                <a:rPr lang="en-US" sz="1600" b="1" dirty="0"/>
-                <a:t>.</a:t>
-              </a:r>
-            </a:p>
-            <a:p>
-              <a:pPr algn="ctr"/>
-              <a:r>
-                <a:rPr lang="en-US" sz="1600" b="1" dirty="0"/>
-                <a:t>.</a:t>
-              </a:r>
-            </a:p>
-            <a:p>
-              <a:pPr algn="ctr"/>
-              <a:r>
-                <a:rPr lang="en-US" sz="1600" b="1" dirty="0"/>
-                <a:t>.</a:t>
               </a:r>
             </a:p>
           </p:txBody>
@@ -6177,6 +6041,114 @@
                   <a:cs typeface="Times New Roman" panose="02020603050405020304" pitchFamily="18" charset="0"/>
                 </a:rPr>
                 <a:t>n</a:t>
+              </a:r>
+            </a:p>
+          </p:txBody>
+        </p:sp>
+        <p:sp>
+          <p:nvSpPr>
+            <p:cNvPr id="19" name="TextBox 18">
+              <a:extLst>
+                <a:ext uri="{FF2B5EF4-FFF2-40B4-BE49-F238E27FC236}">
+                  <a16:creationId xmlns:a16="http://schemas.microsoft.com/office/drawing/2014/main" id="{0812D904-D793-AD4C-A07C-2F61FFDC77C8}"/>
+                </a:ext>
+              </a:extLst>
+            </p:cNvPr>
+            <p:cNvSpPr txBox="1"/>
+            <p:nvPr/>
+          </p:nvSpPr>
+          <p:spPr>
+            <a:xfrm rot="5400000">
+              <a:off x="3579130" y="2422275"/>
+              <a:ext cx="1324303" cy="400110"/>
+            </a:xfrm>
+            <a:prstGeom prst="rect">
+              <a:avLst/>
+            </a:prstGeom>
+            <a:noFill/>
+          </p:spPr>
+          <p:txBody>
+            <a:bodyPr wrap="square" rtlCol="0" anchor="ctr">
+              <a:spAutoFit/>
+            </a:bodyPr>
+            <a:lstStyle/>
+            <a:p>
+              <a:pPr algn="ctr"/>
+              <a:r>
+                <a:rPr lang="en-US" sz="2000" b="1" dirty="0"/>
+                <a:t>.   .   .</a:t>
+              </a:r>
+            </a:p>
+          </p:txBody>
+        </p:sp>
+        <p:sp>
+          <p:nvSpPr>
+            <p:cNvPr id="20" name="TextBox 19">
+              <a:extLst>
+                <a:ext uri="{FF2B5EF4-FFF2-40B4-BE49-F238E27FC236}">
+                  <a16:creationId xmlns:a16="http://schemas.microsoft.com/office/drawing/2014/main" id="{6AD08D2A-F993-5448-8078-28719501DFE1}"/>
+                </a:ext>
+              </a:extLst>
+            </p:cNvPr>
+            <p:cNvSpPr txBox="1"/>
+            <p:nvPr/>
+          </p:nvSpPr>
+          <p:spPr>
+            <a:xfrm rot="5400000">
+              <a:off x="7704440" y="2419439"/>
+              <a:ext cx="1324303" cy="400110"/>
+            </a:xfrm>
+            <a:prstGeom prst="rect">
+              <a:avLst/>
+            </a:prstGeom>
+            <a:noFill/>
+          </p:spPr>
+          <p:txBody>
+            <a:bodyPr wrap="square" rtlCol="0" anchor="ctr">
+              <a:spAutoFit/>
+            </a:bodyPr>
+            <a:lstStyle/>
+            <a:p>
+              <a:pPr algn="ctr"/>
+              <a:r>
+                <a:rPr lang="en-US" sz="2000" b="1" dirty="0"/>
+                <a:t>.   .   .</a:t>
+              </a:r>
+            </a:p>
+          </p:txBody>
+        </p:sp>
+        <p:sp>
+          <p:nvSpPr>
+            <p:cNvPr id="21" name="TextBox 20">
+              <a:extLst>
+                <a:ext uri="{FF2B5EF4-FFF2-40B4-BE49-F238E27FC236}">
+                  <a16:creationId xmlns:a16="http://schemas.microsoft.com/office/drawing/2014/main" id="{8F386E69-BEC5-CC40-9072-1F226C2C35FB}"/>
+                </a:ext>
+              </a:extLst>
+            </p:cNvPr>
+            <p:cNvSpPr txBox="1"/>
+            <p:nvPr/>
+          </p:nvSpPr>
+          <p:spPr>
+            <a:xfrm>
+              <a:off x="5517928" y="3315657"/>
+              <a:ext cx="1324303" cy="400110"/>
+            </a:xfrm>
+            <a:prstGeom prst="rect">
+              <a:avLst/>
+            </a:prstGeom>
+            <a:noFill/>
+          </p:spPr>
+          <p:txBody>
+            <a:bodyPr wrap="square" rtlCol="0" anchor="ctr">
+              <a:spAutoFit/>
+            </a:bodyPr>
+            <a:lstStyle/>
+            <a:p>
+              <a:pPr algn="ctr"/>
+              <a:r>
+                <a:rPr lang="en-US" sz="2000" b="1" dirty="0"/>
+                <a:t>.   .   .</a:t>
               </a:r>
             </a:p>
           </p:txBody>

</xml_diff>